<commit_message>
add server based classifier
</commit_message>
<xml_diff>
--- a/doc/SoftwareDesign/Architecture-SDNSwitch.pptx
+++ b/doc/SoftwareDesign/Architecture-SDNSwitch.pptx
@@ -208,7 +208,7 @@
           <a:p>
             <a:fld id="{28F549E5-EDF6-49DA-A258-26AEF78D5914}" type="datetimeFigureOut">
               <a:rPr lang="zh-CN" altLang="en-US" smtClean="0"/>
-              <a:t>2020/8/3</a:t>
+              <a:t>2020/8/9</a:t>
             </a:fld>
             <a:endParaRPr lang="zh-CN" altLang="en-US"/>
           </a:p>
@@ -1042,7 +1042,7 @@
           <a:p>
             <a:fld id="{8C8FE85A-A409-47B8-9A34-876552EE5CE2}" type="datetimeFigureOut">
               <a:rPr lang="zh-CN" altLang="en-US" smtClean="0"/>
-              <a:t>2020/8/3</a:t>
+              <a:t>2020/8/9</a:t>
             </a:fld>
             <a:endParaRPr lang="zh-CN" altLang="en-US"/>
           </a:p>
@@ -1240,7 +1240,7 @@
           <a:p>
             <a:fld id="{8C8FE85A-A409-47B8-9A34-876552EE5CE2}" type="datetimeFigureOut">
               <a:rPr lang="zh-CN" altLang="en-US" smtClean="0"/>
-              <a:t>2020/8/3</a:t>
+              <a:t>2020/8/9</a:t>
             </a:fld>
             <a:endParaRPr lang="zh-CN" altLang="en-US"/>
           </a:p>
@@ -1448,7 +1448,7 @@
           <a:p>
             <a:fld id="{8C8FE85A-A409-47B8-9A34-876552EE5CE2}" type="datetimeFigureOut">
               <a:rPr lang="zh-CN" altLang="en-US" smtClean="0"/>
-              <a:t>2020/8/3</a:t>
+              <a:t>2020/8/9</a:t>
             </a:fld>
             <a:endParaRPr lang="zh-CN" altLang="en-US"/>
           </a:p>
@@ -1646,7 +1646,7 @@
           <a:p>
             <a:fld id="{8C8FE85A-A409-47B8-9A34-876552EE5CE2}" type="datetimeFigureOut">
               <a:rPr lang="zh-CN" altLang="en-US" smtClean="0"/>
-              <a:t>2020/8/3</a:t>
+              <a:t>2020/8/9</a:t>
             </a:fld>
             <a:endParaRPr lang="zh-CN" altLang="en-US"/>
           </a:p>
@@ -1921,7 +1921,7 @@
           <a:p>
             <a:fld id="{8C8FE85A-A409-47B8-9A34-876552EE5CE2}" type="datetimeFigureOut">
               <a:rPr lang="zh-CN" altLang="en-US" smtClean="0"/>
-              <a:t>2020/8/3</a:t>
+              <a:t>2020/8/9</a:t>
             </a:fld>
             <a:endParaRPr lang="zh-CN" altLang="en-US"/>
           </a:p>
@@ -2186,7 +2186,7 @@
           <a:p>
             <a:fld id="{8C8FE85A-A409-47B8-9A34-876552EE5CE2}" type="datetimeFigureOut">
               <a:rPr lang="zh-CN" altLang="en-US" smtClean="0"/>
-              <a:t>2020/8/3</a:t>
+              <a:t>2020/8/9</a:t>
             </a:fld>
             <a:endParaRPr lang="zh-CN" altLang="en-US"/>
           </a:p>
@@ -2598,7 +2598,7 @@
           <a:p>
             <a:fld id="{8C8FE85A-A409-47B8-9A34-876552EE5CE2}" type="datetimeFigureOut">
               <a:rPr lang="zh-CN" altLang="en-US" smtClean="0"/>
-              <a:t>2020/8/3</a:t>
+              <a:t>2020/8/9</a:t>
             </a:fld>
             <a:endParaRPr lang="zh-CN" altLang="en-US"/>
           </a:p>
@@ -2739,7 +2739,7 @@
           <a:p>
             <a:fld id="{8C8FE85A-A409-47B8-9A34-876552EE5CE2}" type="datetimeFigureOut">
               <a:rPr lang="zh-CN" altLang="en-US" smtClean="0"/>
-              <a:t>2020/8/3</a:t>
+              <a:t>2020/8/9</a:t>
             </a:fld>
             <a:endParaRPr lang="zh-CN" altLang="en-US"/>
           </a:p>
@@ -2852,7 +2852,7 @@
           <a:p>
             <a:fld id="{8C8FE85A-A409-47B8-9A34-876552EE5CE2}" type="datetimeFigureOut">
               <a:rPr lang="zh-CN" altLang="en-US" smtClean="0"/>
-              <a:t>2020/8/3</a:t>
+              <a:t>2020/8/9</a:t>
             </a:fld>
             <a:endParaRPr lang="zh-CN" altLang="en-US"/>
           </a:p>
@@ -3163,7 +3163,7 @@
           <a:p>
             <a:fld id="{8C8FE85A-A409-47B8-9A34-876552EE5CE2}" type="datetimeFigureOut">
               <a:rPr lang="zh-CN" altLang="en-US" smtClean="0"/>
-              <a:t>2020/8/3</a:t>
+              <a:t>2020/8/9</a:t>
             </a:fld>
             <a:endParaRPr lang="zh-CN" altLang="en-US"/>
           </a:p>
@@ -3451,7 +3451,7 @@
           <a:p>
             <a:fld id="{8C8FE85A-A409-47B8-9A34-876552EE5CE2}" type="datetimeFigureOut">
               <a:rPr lang="zh-CN" altLang="en-US" smtClean="0"/>
-              <a:t>2020/8/3</a:t>
+              <a:t>2020/8/9</a:t>
             </a:fld>
             <a:endParaRPr lang="zh-CN" altLang="en-US"/>
           </a:p>
@@ -3692,7 +3692,7 @@
           <a:p>
             <a:fld id="{8C8FE85A-A409-47B8-9A34-876552EE5CE2}" type="datetimeFigureOut">
               <a:rPr lang="zh-CN" altLang="en-US" smtClean="0"/>
-              <a:t>2020/8/3</a:t>
+              <a:t>2020/8/9</a:t>
             </a:fld>
             <a:endParaRPr lang="zh-CN" altLang="en-US"/>
           </a:p>
@@ -7022,56 +7022,6 @@
       </p:grpSpPr>
       <p:sp>
         <p:nvSpPr>
-          <p:cNvPr id="63" name="矩形: 圆角 62">
-            <a:extLst>
-              <a:ext uri="{FF2B5EF4-FFF2-40B4-BE49-F238E27FC236}">
-                <a16:creationId xmlns:a16="http://schemas.microsoft.com/office/drawing/2014/main" id="{3FF7420C-42C5-4C6F-BA70-B4BCE9F5FCAA}"/>
-              </a:ext>
-            </a:extLst>
-          </p:cNvPr>
-          <p:cNvSpPr/>
-          <p:nvPr/>
-        </p:nvSpPr>
-        <p:spPr>
-          <a:xfrm>
-            <a:off x="9230039" y="5811591"/>
-            <a:ext cx="1490162" cy="379257"/>
-          </a:xfrm>
-          <a:prstGeom prst="roundRect">
-            <a:avLst/>
-          </a:prstGeom>
-        </p:spPr>
-        <p:style>
-          <a:lnRef idx="2">
-            <a:schemeClr val="accent4">
-              <a:shade val="50000"/>
-            </a:schemeClr>
-          </a:lnRef>
-          <a:fillRef idx="1">
-            <a:schemeClr val="accent4"/>
-          </a:fillRef>
-          <a:effectRef idx="0">
-            <a:schemeClr val="accent4"/>
-          </a:effectRef>
-          <a:fontRef idx="minor">
-            <a:schemeClr val="lt1"/>
-          </a:fontRef>
-        </p:style>
-        <p:txBody>
-          <a:bodyPr rtlCol="0" anchor="ctr"/>
-          <a:lstStyle/>
-          <a:p>
-            <a:pPr algn="ctr"/>
-            <a:r>
-              <a:rPr lang="en-US" altLang="zh-CN" dirty="0"/>
-              <a:t>RabbitMQ</a:t>
-            </a:r>
-            <a:endParaRPr lang="zh-CN" altLang="en-US" dirty="0"/>
-          </a:p>
-        </p:txBody>
-      </p:sp>
-      <p:sp>
-        <p:nvSpPr>
           <p:cNvPr id="104" name="矩形: 圆角 103">
             <a:extLst>
               <a:ext uri="{FF2B5EF4-FFF2-40B4-BE49-F238E27FC236}">
@@ -7963,56 +7913,6 @@
       </p:cxnSp>
       <p:sp>
         <p:nvSpPr>
-          <p:cNvPr id="61" name="矩形: 圆角 60">
-            <a:extLst>
-              <a:ext uri="{FF2B5EF4-FFF2-40B4-BE49-F238E27FC236}">
-                <a16:creationId xmlns:a16="http://schemas.microsoft.com/office/drawing/2014/main" id="{A7B3F63E-C11E-4F1C-BDEC-D1C642EC4D3B}"/>
-              </a:ext>
-            </a:extLst>
-          </p:cNvPr>
-          <p:cNvSpPr/>
-          <p:nvPr/>
-        </p:nvSpPr>
-        <p:spPr>
-          <a:xfrm>
-            <a:off x="5424903" y="2997674"/>
-            <a:ext cx="2106190" cy="539906"/>
-          </a:xfrm>
-          <a:prstGeom prst="roundRect">
-            <a:avLst/>
-          </a:prstGeom>
-        </p:spPr>
-        <p:style>
-          <a:lnRef idx="2">
-            <a:schemeClr val="accent4">
-              <a:shade val="50000"/>
-            </a:schemeClr>
-          </a:lnRef>
-          <a:fillRef idx="1">
-            <a:schemeClr val="accent4"/>
-          </a:fillRef>
-          <a:effectRef idx="0">
-            <a:schemeClr val="accent4"/>
-          </a:effectRef>
-          <a:fontRef idx="minor">
-            <a:schemeClr val="lt1"/>
-          </a:fontRef>
-        </p:style>
-        <p:txBody>
-          <a:bodyPr rtlCol="0" anchor="ctr"/>
-          <a:lstStyle/>
-          <a:p>
-            <a:pPr algn="ctr"/>
-            <a:r>
-              <a:rPr lang="en-US" altLang="zh-CN" dirty="0"/>
-              <a:t>RabbitMQ</a:t>
-            </a:r>
-            <a:endParaRPr lang="zh-CN" altLang="en-US" dirty="0"/>
-          </a:p>
-        </p:txBody>
-      </p:sp>
-      <p:sp>
-        <p:nvSpPr>
           <p:cNvPr id="72" name="圆柱体 71">
             <a:extLst>
               <a:ext uri="{FF2B5EF4-FFF2-40B4-BE49-F238E27FC236}">
@@ -8207,7 +8107,7 @@
         </p:nvSpPr>
         <p:spPr>
           <a:xfrm>
-            <a:off x="202755" y="1167177"/>
+            <a:off x="202517" y="1420317"/>
             <a:ext cx="833864" cy="1741080"/>
           </a:xfrm>
           <a:prstGeom prst="rect">
@@ -8271,7 +8171,7 @@
         </p:nvSpPr>
         <p:spPr>
           <a:xfrm>
-            <a:off x="1952781" y="1167176"/>
+            <a:off x="1952543" y="1420316"/>
             <a:ext cx="1633586" cy="524819"/>
           </a:xfrm>
           <a:prstGeom prst="rect">
@@ -8321,7 +8221,7 @@
         </p:nvSpPr>
         <p:spPr>
           <a:xfrm>
-            <a:off x="1957308" y="1767451"/>
+            <a:off x="1957070" y="2020591"/>
             <a:ext cx="1633586" cy="524819"/>
           </a:xfrm>
           <a:prstGeom prst="rect">
@@ -8371,7 +8271,7 @@
         </p:nvSpPr>
         <p:spPr>
           <a:xfrm>
-            <a:off x="1962200" y="2383437"/>
+            <a:off x="1961962" y="2636577"/>
             <a:ext cx="1633586" cy="524819"/>
           </a:xfrm>
           <a:prstGeom prst="rect">
@@ -8421,7 +8321,7 @@
         </p:nvSpPr>
         <p:spPr>
           <a:xfrm>
-            <a:off x="1358904" y="1167177"/>
+            <a:off x="1358666" y="1420317"/>
             <a:ext cx="602608" cy="1741080"/>
           </a:xfrm>
           <a:prstGeom prst="rect">
@@ -8475,7 +8375,7 @@
         </p:nvCxnSpPr>
         <p:spPr>
           <a:xfrm>
-            <a:off x="1036619" y="2037717"/>
+            <a:off x="1036381" y="2290857"/>
             <a:ext cx="322285" cy="0"/>
           </a:xfrm>
           <a:prstGeom prst="straightConnector1">
@@ -8518,8 +8418,8 @@
         </p:nvCxnSpPr>
         <p:spPr>
           <a:xfrm flipV="1">
-            <a:off x="8940916" y="2176466"/>
-            <a:ext cx="293686" cy="114212"/>
+            <a:off x="8940916" y="1706361"/>
+            <a:ext cx="313194" cy="584317"/>
           </a:xfrm>
           <a:prstGeom prst="straightConnector1">
             <a:avLst/>
@@ -8557,7 +8457,7 @@
         </p:nvSpPr>
         <p:spPr>
           <a:xfrm>
-            <a:off x="8514846" y="1759643"/>
+            <a:off x="8513433" y="1582010"/>
             <a:ext cx="692818" cy="369332"/>
           </a:xfrm>
           <a:prstGeom prst="rect">
@@ -8604,9 +8504,9 @@
           <p:nvPr/>
         </p:nvCxnSpPr>
         <p:spPr>
-          <a:xfrm>
-            <a:off x="6037922" y="1481457"/>
-            <a:ext cx="4609318" cy="461903"/>
+          <a:xfrm flipV="1">
+            <a:off x="6037922" y="1473255"/>
+            <a:ext cx="4628826" cy="8202"/>
           </a:xfrm>
           <a:prstGeom prst="straightConnector1">
             <a:avLst/>
@@ -8687,7 +8587,7 @@
         </p:nvGrpSpPr>
         <p:grpSpPr>
           <a:xfrm>
-            <a:off x="9228408" y="1943360"/>
+            <a:off x="9247916" y="1473255"/>
             <a:ext cx="2859552" cy="2205653"/>
             <a:chOff x="9410533" y="2079987"/>
             <a:chExt cx="2375752" cy="2205653"/>
@@ -9018,8 +8918,8 @@
         </p:nvCxnSpPr>
         <p:spPr>
           <a:xfrm>
-            <a:off x="4570429" y="5088154"/>
-            <a:ext cx="1182593" cy="288668"/>
+            <a:off x="5016496" y="5088154"/>
+            <a:ext cx="736526" cy="288668"/>
           </a:xfrm>
           <a:prstGeom prst="straightConnector1">
             <a:avLst/>
@@ -9150,7 +9050,7 @@
               <a:pPr algn="ctr"/>
               <a:r>
                 <a:rPr lang="en-US" altLang="zh-CN" dirty="0"/>
-                <a:t>BESS </a:t>
+                <a:t>SFF</a:t>
               </a:r>
             </a:p>
             <a:p>
@@ -9207,7 +9107,7 @@
               <a:pPr algn="ctr"/>
               <a:r>
                 <a:rPr lang="en-US" altLang="zh-CN" dirty="0"/>
-                <a:t>Docker</a:t>
+                <a:t>VNF</a:t>
               </a:r>
             </a:p>
             <a:p>
@@ -9395,8 +9295,8 @@
         </p:nvSpPr>
         <p:spPr>
           <a:xfrm>
-            <a:off x="2845380" y="3537977"/>
-            <a:ext cx="1633587" cy="402227"/>
+            <a:off x="202517" y="3769737"/>
+            <a:ext cx="11812674" cy="402227"/>
           </a:xfrm>
           <a:prstGeom prst="rect">
             <a:avLst/>
@@ -9444,7 +9344,7 @@
           </p:cNvPr>
           <p:cNvCxnSpPr>
             <a:cxnSpLocks/>
-            <a:stCxn id="61" idx="0"/>
+            <a:stCxn id="83" idx="0"/>
             <a:endCxn id="3" idx="2"/>
           </p:cNvCxnSpPr>
           <p:nvPr/>
@@ -9452,7 +9352,7 @@
         <p:spPr>
           <a:xfrm flipH="1" flipV="1">
             <a:off x="5461696" y="2705001"/>
-            <a:ext cx="1016302" cy="292673"/>
+            <a:ext cx="647158" cy="1064736"/>
           </a:xfrm>
           <a:prstGeom prst="straightConnector1">
             <a:avLst/>
@@ -9493,64 +9393,15 @@
           </p:cNvPr>
           <p:cNvCxnSpPr>
             <a:cxnSpLocks/>
-            <a:stCxn id="61" idx="0"/>
+            <a:stCxn id="83" idx="0"/>
             <a:endCxn id="84" idx="2"/>
           </p:cNvCxnSpPr>
           <p:nvPr/>
         </p:nvCxnSpPr>
         <p:spPr>
           <a:xfrm flipV="1">
-            <a:off x="6477998" y="2716900"/>
-            <a:ext cx="1369409" cy="280774"/>
-          </a:xfrm>
-          <a:prstGeom prst="straightConnector1">
-            <a:avLst/>
-          </a:prstGeom>
-          <a:ln w="9525" cap="flat" cmpd="sng" algn="ctr">
-            <a:solidFill>
-              <a:schemeClr val="accent1"/>
-            </a:solidFill>
-            <a:prstDash val="dash"/>
-            <a:round/>
-            <a:headEnd type="none" w="med" len="med"/>
-            <a:tailEnd type="none" w="med" len="med"/>
-          </a:ln>
-        </p:spPr>
-        <p:style>
-          <a:lnRef idx="0">
-            <a:scrgbClr r="0" g="0" b="0"/>
-          </a:lnRef>
-          <a:fillRef idx="0">
-            <a:scrgbClr r="0" g="0" b="0"/>
-          </a:fillRef>
-          <a:effectRef idx="0">
-            <a:scrgbClr r="0" g="0" b="0"/>
-          </a:effectRef>
-          <a:fontRef idx="minor">
-            <a:schemeClr val="tx1"/>
-          </a:fontRef>
-        </p:style>
-      </p:cxnSp>
-      <p:cxnSp>
-        <p:nvCxnSpPr>
-          <p:cNvPr id="93" name="直接箭头连接符 92">
-            <a:extLst>
-              <a:ext uri="{FF2B5EF4-FFF2-40B4-BE49-F238E27FC236}">
-                <a16:creationId xmlns:a16="http://schemas.microsoft.com/office/drawing/2014/main" id="{E83EF642-32D8-4DB5-88B5-49CAFC8D25DF}"/>
-              </a:ext>
-            </a:extLst>
-          </p:cNvPr>
-          <p:cNvCxnSpPr>
-            <a:cxnSpLocks/>
-            <a:stCxn id="61" idx="2"/>
-            <a:endCxn id="83" idx="3"/>
-          </p:cNvCxnSpPr>
-          <p:nvPr/>
-        </p:nvCxnSpPr>
-        <p:spPr>
-          <a:xfrm flipH="1">
-            <a:off x="4478967" y="3537580"/>
-            <a:ext cx="1999031" cy="201511"/>
+            <a:off x="6108854" y="2716900"/>
+            <a:ext cx="1738553" cy="1052837"/>
           </a:xfrm>
           <a:prstGeom prst="straightConnector1">
             <a:avLst/>
@@ -9592,14 +9443,14 @@
           <p:cNvCxnSpPr>
             <a:cxnSpLocks/>
             <a:stCxn id="154" idx="3"/>
-            <a:endCxn id="61" idx="1"/>
+            <a:endCxn id="3" idx="1"/>
           </p:cNvCxnSpPr>
           <p:nvPr/>
         </p:nvCxnSpPr>
         <p:spPr>
           <a:xfrm>
-            <a:off x="3590894" y="2029861"/>
-            <a:ext cx="1834009" cy="1237766"/>
+            <a:off x="3590656" y="2283001"/>
+            <a:ext cx="697403" cy="5132"/>
           </a:xfrm>
           <a:prstGeom prst="straightConnector1">
             <a:avLst/>
@@ -9641,14 +9492,14 @@
           <p:cNvCxnSpPr>
             <a:cxnSpLocks/>
             <a:stCxn id="69" idx="0"/>
-            <a:endCxn id="61" idx="2"/>
+            <a:endCxn id="83" idx="2"/>
           </p:cNvCxnSpPr>
           <p:nvPr/>
         </p:nvCxnSpPr>
         <p:spPr>
           <a:xfrm flipV="1">
-            <a:off x="3830987" y="3537580"/>
-            <a:ext cx="2647011" cy="1028721"/>
+            <a:off x="3305684" y="4171964"/>
+            <a:ext cx="2803170" cy="391779"/>
           </a:xfrm>
           <a:prstGeom prst="straightConnector1">
             <a:avLst/>
@@ -9690,14 +9541,14 @@
           <p:cNvCxnSpPr>
             <a:cxnSpLocks/>
             <a:stCxn id="60" idx="0"/>
-            <a:endCxn id="61" idx="2"/>
+            <a:endCxn id="83" idx="2"/>
           </p:cNvCxnSpPr>
           <p:nvPr/>
         </p:nvCxnSpPr>
         <p:spPr>
           <a:xfrm flipH="1" flipV="1">
-            <a:off x="6477998" y="3537580"/>
-            <a:ext cx="2676505" cy="973400"/>
+            <a:off x="6108854" y="4171964"/>
+            <a:ext cx="3045649" cy="339016"/>
           </a:xfrm>
           <a:prstGeom prst="straightConnector1">
             <a:avLst/>
@@ -9739,49 +9590,123 @@
           <p:cNvCxnSpPr>
             <a:cxnSpLocks/>
             <a:stCxn id="203" idx="1"/>
-            <a:endCxn id="61" idx="3"/>
+            <a:endCxn id="3" idx="2"/>
           </p:cNvCxnSpPr>
           <p:nvPr/>
         </p:nvCxnSpPr>
         <p:spPr>
           <a:xfrm flipH="1" flipV="1">
-            <a:off x="7531093" y="3267627"/>
-            <a:ext cx="1714462" cy="240760"/>
+            <a:off x="5461696" y="2705001"/>
+            <a:ext cx="3803367" cy="333281"/>
           </a:xfrm>
           <a:prstGeom prst="straightConnector1">
             <a:avLst/>
           </a:prstGeom>
-          <a:ln w="9525" cap="flat" cmpd="sng" algn="ctr">
-            <a:solidFill>
-              <a:schemeClr val="accent1"/>
-            </a:solidFill>
-            <a:prstDash val="dash"/>
-            <a:round/>
-            <a:headEnd type="none" w="med" len="med"/>
-            <a:tailEnd type="none" w="med" len="med"/>
+          <a:ln>
+            <a:tailEnd type="triangle"/>
           </a:ln>
         </p:spPr>
         <p:style>
-          <a:lnRef idx="0">
-            <a:scrgbClr r="0" g="0" b="0"/>
+          <a:lnRef idx="1">
+            <a:schemeClr val="accent1"/>
           </a:lnRef>
           <a:fillRef idx="0">
-            <a:scrgbClr r="0" g="0" b="0"/>
+            <a:schemeClr val="accent1"/>
           </a:fillRef>
           <a:effectRef idx="0">
-            <a:scrgbClr r="0" g="0" b="0"/>
+            <a:schemeClr val="accent1"/>
           </a:effectRef>
           <a:fontRef idx="minor">
             <a:schemeClr val="tx1"/>
           </a:fontRef>
         </p:style>
       </p:cxnSp>
+      <p:sp>
+        <p:nvSpPr>
+          <p:cNvPr id="24" name="文本框 23">
+            <a:extLst>
+              <a:ext uri="{FF2B5EF4-FFF2-40B4-BE49-F238E27FC236}">
+                <a16:creationId xmlns:a16="http://schemas.microsoft.com/office/drawing/2014/main" id="{03B58EF8-E2F2-4783-AC78-7D496CD6E96C}"/>
+              </a:ext>
+            </a:extLst>
+          </p:cNvPr>
+          <p:cNvSpPr txBox="1"/>
+          <p:nvPr/>
+        </p:nvSpPr>
+        <p:spPr>
+          <a:xfrm>
+            <a:off x="734847" y="5821516"/>
+            <a:ext cx="1178528" cy="369332"/>
+          </a:xfrm>
+          <a:prstGeom prst="rect">
+            <a:avLst/>
+          </a:prstGeom>
+          <a:noFill/>
+        </p:spPr>
+        <p:txBody>
+          <a:bodyPr wrap="none" rtlCol="0">
+            <a:spAutoFit/>
+          </a:bodyPr>
+          <a:lstStyle/>
+          <a:p>
+            <a:r>
+              <a:rPr lang="en-US" altLang="zh-CN" b="1" dirty="0"/>
+              <a:t>Ryu Apps</a:t>
+            </a:r>
+            <a:endParaRPr lang="zh-CN" altLang="en-US" b="1" dirty="0"/>
+          </a:p>
+        </p:txBody>
+      </p:sp>
+      <p:sp>
+        <p:nvSpPr>
+          <p:cNvPr id="100" name="文本框 99">
+            <a:extLst>
+              <a:ext uri="{FF2B5EF4-FFF2-40B4-BE49-F238E27FC236}">
+                <a16:creationId xmlns:a16="http://schemas.microsoft.com/office/drawing/2014/main" id="{2C0CB370-132F-495A-8318-8E0CB8DDA80C}"/>
+              </a:ext>
+            </a:extLst>
+          </p:cNvPr>
+          <p:cNvSpPr txBox="1"/>
+          <p:nvPr/>
+        </p:nvSpPr>
+        <p:spPr>
+          <a:xfrm>
+            <a:off x="8244325" y="2840284"/>
+            <a:ext cx="857927" cy="369332"/>
+          </a:xfrm>
+          <a:prstGeom prst="rect">
+            <a:avLst/>
+          </a:prstGeom>
+          <a:noFill/>
+        </p:spPr>
+        <p:txBody>
+          <a:bodyPr wrap="none" rtlCol="0">
+            <a:spAutoFit/>
+          </a:bodyPr>
+          <a:lstStyle/>
+          <a:p>
+            <a:r>
+              <a:rPr lang="en-US" altLang="zh-CN" b="1" dirty="0">
+                <a:solidFill>
+                  <a:srgbClr val="FF0000"/>
+                </a:solidFill>
+              </a:rPr>
+              <a:t>Adjust</a:t>
+            </a:r>
+            <a:endParaRPr lang="zh-CN" altLang="en-US" b="1" dirty="0">
+              <a:solidFill>
+                <a:srgbClr val="FF0000"/>
+              </a:solidFill>
+            </a:endParaRPr>
+          </a:p>
+        </p:txBody>
+      </p:sp>
       <p:grpSp>
         <p:nvGrpSpPr>
-          <p:cNvPr id="9" name="组合 8">
-            <a:extLst>
-              <a:ext uri="{FF2B5EF4-FFF2-40B4-BE49-F238E27FC236}">
-                <a16:creationId xmlns:a16="http://schemas.microsoft.com/office/drawing/2014/main" id="{16BB9ABC-2E92-4132-B634-728183B866A6}"/>
+          <p:cNvPr id="63" name="组合 62">
+            <a:extLst>
+              <a:ext uri="{FF2B5EF4-FFF2-40B4-BE49-F238E27FC236}">
+                <a16:creationId xmlns:a16="http://schemas.microsoft.com/office/drawing/2014/main" id="{7ABB2B80-8F99-4539-A1AA-F5F3B94943CD}"/>
               </a:ext>
             </a:extLst>
           </p:cNvPr>
@@ -9790,10 +9715,10 @@
         </p:nvGrpSpPr>
         <p:grpSpPr>
           <a:xfrm>
-            <a:off x="698178" y="4465851"/>
-            <a:ext cx="3872251" cy="1244605"/>
-            <a:chOff x="137066" y="4524390"/>
-            <a:chExt cx="3872251" cy="1244605"/>
+            <a:off x="202518" y="4465851"/>
+            <a:ext cx="4813978" cy="1244605"/>
+            <a:chOff x="202518" y="4465851"/>
+            <a:chExt cx="4813978" cy="1244605"/>
           </a:xfrm>
         </p:grpSpPr>
         <p:sp>
@@ -9810,8 +9735,8 @@
           </p:nvSpPr>
           <p:spPr>
             <a:xfrm>
-              <a:off x="2950846" y="5206641"/>
-              <a:ext cx="472199" cy="471686"/>
+              <a:off x="2977595" y="5142530"/>
+              <a:ext cx="710583" cy="471686"/>
             </a:xfrm>
             <a:prstGeom prst="rect">
               <a:avLst/>
@@ -9860,7 +9785,7 @@
           </p:nvSpPr>
           <p:spPr>
             <a:xfrm>
-              <a:off x="1692662" y="5192379"/>
+              <a:off x="1775077" y="5131669"/>
               <a:ext cx="1116039" cy="471686"/>
             </a:xfrm>
             <a:prstGeom prst="rect">
@@ -9910,7 +9835,7 @@
           </p:nvSpPr>
           <p:spPr>
             <a:xfrm>
-              <a:off x="215533" y="5192379"/>
+              <a:off x="297948" y="5131669"/>
               <a:ext cx="1375004" cy="471686"/>
             </a:xfrm>
             <a:prstGeom prst="rect">
@@ -9960,7 +9885,7 @@
           </p:nvSpPr>
           <p:spPr>
             <a:xfrm>
-              <a:off x="1469640" y="4616442"/>
+              <a:off x="1520808" y="4566400"/>
               <a:ext cx="1035797" cy="471686"/>
             </a:xfrm>
             <a:prstGeom prst="rect">
@@ -10010,8 +9935,8 @@
           </p:nvSpPr>
           <p:spPr>
             <a:xfrm>
-              <a:off x="137066" y="4524390"/>
-              <a:ext cx="3872251" cy="1244605"/>
+              <a:off x="202518" y="4465851"/>
+              <a:ext cx="4813978" cy="1244605"/>
             </a:xfrm>
             <a:prstGeom prst="rect">
               <a:avLst/>
@@ -10056,7 +9981,7 @@
           </p:nvSpPr>
           <p:spPr>
             <a:xfrm>
-              <a:off x="215533" y="4617121"/>
+              <a:off x="297948" y="4574167"/>
               <a:ext cx="1143269" cy="471686"/>
             </a:xfrm>
             <a:prstGeom prst="rect">
@@ -10113,7 +10038,7 @@
           </p:nvSpPr>
           <p:spPr>
             <a:xfrm>
-              <a:off x="2620863" y="4624840"/>
+              <a:off x="2656672" y="4563743"/>
               <a:ext cx="1298023" cy="471686"/>
             </a:xfrm>
             <a:prstGeom prst="rect">
@@ -10149,43 +10074,111 @@
             </a:p>
           </p:txBody>
         </p:sp>
+        <p:sp>
+          <p:nvSpPr>
+            <p:cNvPr id="101" name="矩形 100">
+              <a:extLst>
+                <a:ext uri="{FF2B5EF4-FFF2-40B4-BE49-F238E27FC236}">
+                  <a16:creationId xmlns:a16="http://schemas.microsoft.com/office/drawing/2014/main" id="{AACAC9B9-0784-4239-98FE-773E53E5A5AF}"/>
+                </a:ext>
+              </a:extLst>
+            </p:cNvPr>
+            <p:cNvSpPr/>
+            <p:nvPr/>
+          </p:nvSpPr>
+          <p:spPr>
+            <a:xfrm>
+              <a:off x="3831064" y="5142530"/>
+              <a:ext cx="1035797" cy="471686"/>
+            </a:xfrm>
+            <a:prstGeom prst="rect">
+              <a:avLst/>
+            </a:prstGeom>
+          </p:spPr>
+          <p:style>
+            <a:lnRef idx="2">
+              <a:schemeClr val="accent6">
+                <a:shade val="50000"/>
+              </a:schemeClr>
+            </a:lnRef>
+            <a:fillRef idx="1">
+              <a:schemeClr val="accent6"/>
+            </a:fillRef>
+            <a:effectRef idx="0">
+              <a:schemeClr val="accent6"/>
+            </a:effectRef>
+            <a:fontRef idx="minor">
+              <a:schemeClr val="lt1"/>
+            </a:fontRef>
+          </p:style>
+          <p:txBody>
+            <a:bodyPr rtlCol="0" anchor="ctr"/>
+            <a:lstStyle/>
+            <a:p>
+              <a:pPr algn="ctr"/>
+              <a:r>
+                <a:rPr lang="en-US" altLang="zh-CN" dirty="0"/>
+                <a:t>SFC-</a:t>
+              </a:r>
+              <a:r>
+                <a:rPr lang="en-US" altLang="zh-CN" dirty="0" err="1"/>
+                <a:t>NotVia</a:t>
+              </a:r>
+              <a:endParaRPr lang="zh-CN" altLang="en-US" dirty="0"/>
+            </a:p>
+          </p:txBody>
+        </p:sp>
+        <p:sp>
+          <p:nvSpPr>
+            <p:cNvPr id="108" name="矩形 107">
+              <a:extLst>
+                <a:ext uri="{FF2B5EF4-FFF2-40B4-BE49-F238E27FC236}">
+                  <a16:creationId xmlns:a16="http://schemas.microsoft.com/office/drawing/2014/main" id="{FAC1E66D-01C3-42E4-8B96-98D4FA8BF4D4}"/>
+                </a:ext>
+              </a:extLst>
+            </p:cNvPr>
+            <p:cNvSpPr/>
+            <p:nvPr/>
+          </p:nvSpPr>
+          <p:spPr>
+            <a:xfrm>
+              <a:off x="4041394" y="4556655"/>
+              <a:ext cx="814691" cy="471686"/>
+            </a:xfrm>
+            <a:prstGeom prst="rect">
+              <a:avLst/>
+            </a:prstGeom>
+          </p:spPr>
+          <p:style>
+            <a:lnRef idx="2">
+              <a:schemeClr val="accent6">
+                <a:shade val="50000"/>
+              </a:schemeClr>
+            </a:lnRef>
+            <a:fillRef idx="1">
+              <a:schemeClr val="accent6"/>
+            </a:fillRef>
+            <a:effectRef idx="0">
+              <a:schemeClr val="accent6"/>
+            </a:effectRef>
+            <a:fontRef idx="minor">
+              <a:schemeClr val="lt1"/>
+            </a:fontRef>
+          </p:style>
+          <p:txBody>
+            <a:bodyPr rtlCol="0" anchor="ctr"/>
+            <a:lstStyle/>
+            <a:p>
+              <a:pPr algn="ctr"/>
+              <a:r>
+                <a:rPr lang="en-US" altLang="zh-CN" dirty="0"/>
+                <a:t>SFC</a:t>
+              </a:r>
+              <a:endParaRPr lang="zh-CN" altLang="en-US" dirty="0"/>
+            </a:p>
+          </p:txBody>
+        </p:sp>
       </p:grpSp>
-      <p:sp>
-        <p:nvSpPr>
-          <p:cNvPr id="24" name="文本框 23">
-            <a:extLst>
-              <a:ext uri="{FF2B5EF4-FFF2-40B4-BE49-F238E27FC236}">
-                <a16:creationId xmlns:a16="http://schemas.microsoft.com/office/drawing/2014/main" id="{03B58EF8-E2F2-4783-AC78-7D496CD6E96C}"/>
-              </a:ext>
-            </a:extLst>
-          </p:cNvPr>
-          <p:cNvSpPr txBox="1"/>
-          <p:nvPr/>
-        </p:nvSpPr>
-        <p:spPr>
-          <a:xfrm>
-            <a:off x="734847" y="5821516"/>
-            <a:ext cx="1178528" cy="369332"/>
-          </a:xfrm>
-          <a:prstGeom prst="rect">
-            <a:avLst/>
-          </a:prstGeom>
-          <a:noFill/>
-        </p:spPr>
-        <p:txBody>
-          <a:bodyPr wrap="none" rtlCol="0">
-            <a:spAutoFit/>
-          </a:bodyPr>
-          <a:lstStyle/>
-          <a:p>
-            <a:r>
-              <a:rPr lang="en-US" altLang="zh-CN" b="1" dirty="0"/>
-              <a:t>Ryu Apps</a:t>
-            </a:r>
-            <a:endParaRPr lang="zh-CN" altLang="en-US" b="1" dirty="0"/>
-          </a:p>
-        </p:txBody>
-      </p:sp>
     </p:spTree>
     <p:extLst>
       <p:ext uri="{BB962C8B-B14F-4D97-AF65-F5344CB8AC3E}">
@@ -15012,7 +15005,7 @@
             <a:pPr algn="ctr"/>
             <a:r>
               <a:rPr lang="en-US" altLang="zh-CN" dirty="0"/>
-              <a:t>BESS Controller</a:t>
+              <a:t>SFF Controller</a:t>
             </a:r>
             <a:endParaRPr lang="zh-CN" altLang="en-US" dirty="0"/>
           </a:p>
@@ -17063,7 +17056,7 @@
             <a:pPr algn="ctr"/>
             <a:r>
               <a:rPr lang="en-US" altLang="zh-CN" dirty="0"/>
-              <a:t>BESS Controller</a:t>
+              <a:t>SFF Controller</a:t>
             </a:r>
             <a:endParaRPr lang="zh-CN" altLang="en-US" dirty="0"/>
           </a:p>

</xml_diff>